<commit_message>
Added changes for week 2
</commit_message>
<xml_diff>
--- a/slides/PS4106 - debugging.pptx
+++ b/slides/PS4106 - debugging.pptx
@@ -23,8 +23,9 @@
     <p:sldId id="267" r:id="rId17"/>
     <p:sldId id="269" r:id="rId18"/>
     <p:sldId id="268" r:id="rId19"/>
-    <p:sldId id="271" r:id="rId20"/>
-    <p:sldId id="272" r:id="rId21"/>
+    <p:sldId id="276" r:id="rId20"/>
+    <p:sldId id="271" r:id="rId21"/>
+    <p:sldId id="272" r:id="rId22"/>
   </p:sldIdLst>
   <p:sldSz cx="12192000" cy="6858000"/>
   <p:notesSz cx="6858000" cy="9144000"/>
@@ -280,7 +281,7 @@
           <a:p>
             <a:fld id="{BE379DB5-90DC-CA4E-850A-C726A3332936}" type="datetimeFigureOut">
               <a:rPr lang="en-US" smtClean="0"/>
-              <a:t>10/12/22</a:t>
+              <a:t>9/20/23</a:t>
             </a:fld>
             <a:endParaRPr lang="en-US"/>
           </a:p>
@@ -480,7 +481,7 @@
           <a:p>
             <a:fld id="{BE379DB5-90DC-CA4E-850A-C726A3332936}" type="datetimeFigureOut">
               <a:rPr lang="en-US" smtClean="0"/>
-              <a:t>10/12/22</a:t>
+              <a:t>9/20/23</a:t>
             </a:fld>
             <a:endParaRPr lang="en-US"/>
           </a:p>
@@ -690,7 +691,7 @@
           <a:p>
             <a:fld id="{BE379DB5-90DC-CA4E-850A-C726A3332936}" type="datetimeFigureOut">
               <a:rPr lang="en-US" smtClean="0"/>
-              <a:t>10/12/22</a:t>
+              <a:t>9/20/23</a:t>
             </a:fld>
             <a:endParaRPr lang="en-US"/>
           </a:p>
@@ -890,7 +891,7 @@
           <a:p>
             <a:fld id="{BE379DB5-90DC-CA4E-850A-C726A3332936}" type="datetimeFigureOut">
               <a:rPr lang="en-US" smtClean="0"/>
-              <a:t>10/12/22</a:t>
+              <a:t>9/20/23</a:t>
             </a:fld>
             <a:endParaRPr lang="en-US"/>
           </a:p>
@@ -1166,7 +1167,7 @@
           <a:p>
             <a:fld id="{BE379DB5-90DC-CA4E-850A-C726A3332936}" type="datetimeFigureOut">
               <a:rPr lang="en-US" smtClean="0"/>
-              <a:t>10/12/22</a:t>
+              <a:t>9/20/23</a:t>
             </a:fld>
             <a:endParaRPr lang="en-US"/>
           </a:p>
@@ -1434,7 +1435,7 @@
           <a:p>
             <a:fld id="{BE379DB5-90DC-CA4E-850A-C726A3332936}" type="datetimeFigureOut">
               <a:rPr lang="en-US" smtClean="0"/>
-              <a:t>10/12/22</a:t>
+              <a:t>9/20/23</a:t>
             </a:fld>
             <a:endParaRPr lang="en-US"/>
           </a:p>
@@ -1849,7 +1850,7 @@
           <a:p>
             <a:fld id="{BE379DB5-90DC-CA4E-850A-C726A3332936}" type="datetimeFigureOut">
               <a:rPr lang="en-US" smtClean="0"/>
-              <a:t>10/12/22</a:t>
+              <a:t>9/20/23</a:t>
             </a:fld>
             <a:endParaRPr lang="en-US"/>
           </a:p>
@@ -1991,7 +1992,7 @@
           <a:p>
             <a:fld id="{BE379DB5-90DC-CA4E-850A-C726A3332936}" type="datetimeFigureOut">
               <a:rPr lang="en-US" smtClean="0"/>
-              <a:t>10/12/22</a:t>
+              <a:t>9/20/23</a:t>
             </a:fld>
             <a:endParaRPr lang="en-US"/>
           </a:p>
@@ -2104,7 +2105,7 @@
           <a:p>
             <a:fld id="{BE379DB5-90DC-CA4E-850A-C726A3332936}" type="datetimeFigureOut">
               <a:rPr lang="en-US" smtClean="0"/>
-              <a:t>10/12/22</a:t>
+              <a:t>9/20/23</a:t>
             </a:fld>
             <a:endParaRPr lang="en-US"/>
           </a:p>
@@ -2417,7 +2418,7 @@
           <a:p>
             <a:fld id="{BE379DB5-90DC-CA4E-850A-C726A3332936}" type="datetimeFigureOut">
               <a:rPr lang="en-US" smtClean="0"/>
-              <a:t>10/12/22</a:t>
+              <a:t>9/20/23</a:t>
             </a:fld>
             <a:endParaRPr lang="en-US"/>
           </a:p>
@@ -2706,7 +2707,7 @@
           <a:p>
             <a:fld id="{BE379DB5-90DC-CA4E-850A-C726A3332936}" type="datetimeFigureOut">
               <a:rPr lang="en-US" smtClean="0"/>
-              <a:t>10/12/22</a:t>
+              <a:t>9/20/23</a:t>
             </a:fld>
             <a:endParaRPr lang="en-US"/>
           </a:p>
@@ -2949,7 +2950,7 @@
           <a:p>
             <a:fld id="{BE379DB5-90DC-CA4E-850A-C726A3332936}" type="datetimeFigureOut">
               <a:rPr lang="en-US" smtClean="0"/>
-              <a:t>10/12/22</a:t>
+              <a:t>9/20/23</a:t>
             </a:fld>
             <a:endParaRPr lang="en-US"/>
           </a:p>
@@ -4946,6 +4947,14 @@
 <file path=ppt/slides/slide19.xml><?xml version="1.0" encoding="utf-8"?>
 <p:sld xmlns:a="http://schemas.openxmlformats.org/drawingml/2006/main" xmlns:r="http://schemas.openxmlformats.org/officeDocument/2006/relationships" xmlns:p="http://schemas.openxmlformats.org/presentationml/2006/main">
   <p:cSld>
+    <p:bg>
+      <p:bgPr>
+        <a:solidFill>
+          <a:schemeClr val="bg1"/>
+        </a:solidFill>
+        <a:effectLst/>
+      </p:bgPr>
+    </p:bg>
     <p:spTree>
       <p:nvGrpSpPr>
         <p:cNvPr id="1" name=""/>
@@ -4960,153 +4969,42 @@
           <a:chExt cx="0" cy="0"/>
         </a:xfrm>
       </p:grpSpPr>
-      <p:sp>
-        <p:nvSpPr>
-          <p:cNvPr id="2" name="Title 1">
-            <a:extLst>
-              <a:ext uri="{FF2B5EF4-FFF2-40B4-BE49-F238E27FC236}">
-                <a16:creationId xmlns:a16="http://schemas.microsoft.com/office/drawing/2014/main" id="{4B68D123-7163-B9F9-F1D2-969BF73BBFB1}"/>
-              </a:ext>
-            </a:extLst>
-          </p:cNvPr>
-          <p:cNvSpPr>
-            <a:spLocks noGrp="1"/>
-          </p:cNvSpPr>
-          <p:nvPr>
-            <p:ph type="title"/>
-          </p:nvPr>
-        </p:nvSpPr>
+      <p:pic>
+        <p:nvPicPr>
+          <p:cNvPr id="4" name="Content Placeholder 3" descr="A screenshot of a computer screen&#10;&#10;Description automatically generated">
+            <a:extLst>
+              <a:ext uri="{FF2B5EF4-FFF2-40B4-BE49-F238E27FC236}">
+                <a16:creationId xmlns:a16="http://schemas.microsoft.com/office/drawing/2014/main" id="{16B5098C-74ED-3C3C-F4EB-E50C35C7B96C}"/>
+              </a:ext>
+            </a:extLst>
+          </p:cNvPr>
+          <p:cNvPicPr>
+            <a:picLocks noGrp="1" noChangeAspect="1"/>
+          </p:cNvPicPr>
+          <p:nvPr>
+            <p:ph idx="1"/>
+          </p:nvPr>
+        </p:nvPicPr>
+        <p:blipFill>
+          <a:blip r:embed="rId2"/>
+          <a:stretch>
+            <a:fillRect/>
+          </a:stretch>
+        </p:blipFill>
         <p:spPr>
           <a:xfrm>
-            <a:off x="630382" y="-85726"/>
-            <a:ext cx="10515600" cy="1325563"/>
-          </a:xfrm>
-        </p:spPr>
-        <p:txBody>
-          <a:bodyPr/>
-          <a:lstStyle/>
-          <a:p>
-            <a:r>
-              <a:rPr lang="en-US" dirty="0"/>
-              <a:t>Rubber Duck Debugging</a:t>
-            </a:r>
-          </a:p>
-        </p:txBody>
-      </p:sp>
-      <p:sp>
-        <p:nvSpPr>
-          <p:cNvPr id="3" name="Content Placeholder 2">
-            <a:extLst>
-              <a:ext uri="{FF2B5EF4-FFF2-40B4-BE49-F238E27FC236}">
-                <a16:creationId xmlns:a16="http://schemas.microsoft.com/office/drawing/2014/main" id="{DABF208C-58B9-2FD7-034D-85CD3F94FD99}"/>
-              </a:ext>
-            </a:extLst>
-          </p:cNvPr>
-          <p:cNvSpPr>
-            <a:spLocks noGrp="1"/>
-          </p:cNvSpPr>
-          <p:nvPr>
-            <p:ph idx="1"/>
-          </p:nvPr>
-        </p:nvSpPr>
-        <p:spPr>
-          <a:xfrm>
-            <a:off x="553985" y="1581784"/>
-            <a:ext cx="5877295" cy="4361815"/>
-          </a:xfrm>
-        </p:spPr>
-        <p:txBody>
-          <a:bodyPr>
-            <a:normAutofit fontScale="92500" lnSpcReduction="20000"/>
-          </a:bodyPr>
-          <a:lstStyle/>
-          <a:p>
-            <a:pPr marL="514350" indent="-514350" algn="l" fontAlgn="base">
-              <a:buFont typeface="+mj-lt"/>
-              <a:buAutoNum type="arabicParenR"/>
-            </a:pPr>
-            <a:r>
-              <a:rPr lang="en-GB" u="none" strike="noStrike" dirty="0">
-                <a:effectLst/>
-              </a:rPr>
-              <a:t>Place rubber duck on desk and inform it you are just going to go over some code with it, if that’s all right.</a:t>
-            </a:r>
-          </a:p>
-          <a:p>
-            <a:pPr marL="514350" indent="-514350" algn="l" fontAlgn="base">
-              <a:buFont typeface="+mj-lt"/>
-              <a:buAutoNum type="arabicParenR"/>
-            </a:pPr>
-            <a:r>
-              <a:rPr lang="en-GB" u="none" strike="noStrike" dirty="0">
-                <a:effectLst/>
-              </a:rPr>
-              <a:t>Explain to the duck what your code is supposed to do, and then go into detail and explain your code line by line.</a:t>
-            </a:r>
-          </a:p>
-          <a:p>
-            <a:pPr marL="514350" indent="-514350" algn="l" fontAlgn="base">
-              <a:buFont typeface="+mj-lt"/>
-              <a:buAutoNum type="arabicParenR"/>
-            </a:pPr>
-            <a:r>
-              <a:rPr lang="en-GB" u="none" strike="noStrike" dirty="0">
-                <a:effectLst/>
-              </a:rPr>
-              <a:t>At some point you will tell the duck what you are doing next and then realise that that is not in fact what you are actually doing. The duck will sit there serenely, happy in the knowledge that it has helped you on your way.</a:t>
-            </a:r>
-          </a:p>
-        </p:txBody>
-      </p:sp>
-      <p:pic>
-        <p:nvPicPr>
-          <p:cNvPr id="1028" name="Picture 4" descr="Rubber Duck Debugging. Wheres my rubber duck!? | by Kelly Dobbins | Medium">
-            <a:extLst>
-              <a:ext uri="{FF2B5EF4-FFF2-40B4-BE49-F238E27FC236}">
-                <a16:creationId xmlns:a16="http://schemas.microsoft.com/office/drawing/2014/main" id="{DCCF7E2A-6864-0460-D2A0-72783D9F5120}"/>
-              </a:ext>
-            </a:extLst>
-          </p:cNvPr>
-          <p:cNvPicPr>
-            <a:picLocks noChangeAspect="1" noChangeArrowheads="1"/>
-          </p:cNvPicPr>
-          <p:nvPr/>
-        </p:nvPicPr>
-        <p:blipFill rotWithShape="1">
-          <a:blip r:embed="rId2">
-            <a:extLst>
-              <a:ext uri="{28A0092B-C50C-407E-A947-70E740481C1C}">
-                <a14:useLocalDpi xmlns:a14="http://schemas.microsoft.com/office/drawing/2010/main" val="0"/>
-              </a:ext>
-            </a:extLst>
-          </a:blip>
-          <a:srcRect l="34250"/>
-          <a:stretch/>
-        </p:blipFill>
-        <p:spPr bwMode="auto">
-          <a:xfrm>
-            <a:off x="6967913" y="1569604"/>
-            <a:ext cx="4670102" cy="3718791"/>
+            <a:off x="1639147" y="643466"/>
+            <a:ext cx="8913706" cy="5571067"/>
           </a:xfrm>
           <a:prstGeom prst="rect">
             <a:avLst/>
           </a:prstGeom>
-          <a:noFill/>
-          <a:extLst>
-            <a:ext uri="{909E8E84-426E-40DD-AFC4-6F175D3DCCD1}">
-              <a14:hiddenFill xmlns:a14="http://schemas.microsoft.com/office/drawing/2010/main">
-                <a:solidFill>
-                  <a:srgbClr val="FFFFFF"/>
-                </a:solidFill>
-              </a14:hiddenFill>
-            </a:ext>
-          </a:extLst>
         </p:spPr>
       </p:pic>
     </p:spTree>
     <p:extLst>
       <p:ext uri="{BB962C8B-B14F-4D97-AF65-F5344CB8AC3E}">
-        <p14:creationId xmlns:p14="http://schemas.microsoft.com/office/powerpoint/2010/main" val="2988442547"/>
+        <p14:creationId xmlns:p14="http://schemas.microsoft.com/office/powerpoint/2010/main" val="2820083756"/>
       </p:ext>
     </p:extLst>
   </p:cSld>
@@ -5252,6 +5150,179 @@
 </file>
 
 <file path=ppt/slides/slide20.xml><?xml version="1.0" encoding="utf-8"?>
+<p:sld xmlns:a="http://schemas.openxmlformats.org/drawingml/2006/main" xmlns:r="http://schemas.openxmlformats.org/officeDocument/2006/relationships" xmlns:p="http://schemas.openxmlformats.org/presentationml/2006/main">
+  <p:cSld>
+    <p:spTree>
+      <p:nvGrpSpPr>
+        <p:cNvPr id="1" name=""/>
+        <p:cNvGrpSpPr/>
+        <p:nvPr/>
+      </p:nvGrpSpPr>
+      <p:grpSpPr>
+        <a:xfrm>
+          <a:off x="0" y="0"/>
+          <a:ext cx="0" cy="0"/>
+          <a:chOff x="0" y="0"/>
+          <a:chExt cx="0" cy="0"/>
+        </a:xfrm>
+      </p:grpSpPr>
+      <p:sp>
+        <p:nvSpPr>
+          <p:cNvPr id="2" name="Title 1">
+            <a:extLst>
+              <a:ext uri="{FF2B5EF4-FFF2-40B4-BE49-F238E27FC236}">
+                <a16:creationId xmlns:a16="http://schemas.microsoft.com/office/drawing/2014/main" id="{4B68D123-7163-B9F9-F1D2-969BF73BBFB1}"/>
+              </a:ext>
+            </a:extLst>
+          </p:cNvPr>
+          <p:cNvSpPr>
+            <a:spLocks noGrp="1"/>
+          </p:cNvSpPr>
+          <p:nvPr>
+            <p:ph type="title"/>
+          </p:nvPr>
+        </p:nvSpPr>
+        <p:spPr>
+          <a:xfrm>
+            <a:off x="630382" y="-85726"/>
+            <a:ext cx="10515600" cy="1325563"/>
+          </a:xfrm>
+        </p:spPr>
+        <p:txBody>
+          <a:bodyPr/>
+          <a:lstStyle/>
+          <a:p>
+            <a:r>
+              <a:rPr lang="en-US" dirty="0"/>
+              <a:t>Rubber Duck Debugging</a:t>
+            </a:r>
+          </a:p>
+        </p:txBody>
+      </p:sp>
+      <p:sp>
+        <p:nvSpPr>
+          <p:cNvPr id="3" name="Content Placeholder 2">
+            <a:extLst>
+              <a:ext uri="{FF2B5EF4-FFF2-40B4-BE49-F238E27FC236}">
+                <a16:creationId xmlns:a16="http://schemas.microsoft.com/office/drawing/2014/main" id="{DABF208C-58B9-2FD7-034D-85CD3F94FD99}"/>
+              </a:ext>
+            </a:extLst>
+          </p:cNvPr>
+          <p:cNvSpPr>
+            <a:spLocks noGrp="1"/>
+          </p:cNvSpPr>
+          <p:nvPr>
+            <p:ph idx="1"/>
+          </p:nvPr>
+        </p:nvSpPr>
+        <p:spPr>
+          <a:xfrm>
+            <a:off x="553985" y="1581784"/>
+            <a:ext cx="5877295" cy="4361815"/>
+          </a:xfrm>
+        </p:spPr>
+        <p:txBody>
+          <a:bodyPr>
+            <a:normAutofit fontScale="92500" lnSpcReduction="20000"/>
+          </a:bodyPr>
+          <a:lstStyle/>
+          <a:p>
+            <a:pPr marL="514350" indent="-514350" algn="l" fontAlgn="base">
+              <a:buFont typeface="+mj-lt"/>
+              <a:buAutoNum type="arabicParenR"/>
+            </a:pPr>
+            <a:r>
+              <a:rPr lang="en-GB" u="none" strike="noStrike" dirty="0">
+                <a:effectLst/>
+              </a:rPr>
+              <a:t>Place rubber duck on desk and inform it you are just going to go over some code with it, if that’s all right.</a:t>
+            </a:r>
+          </a:p>
+          <a:p>
+            <a:pPr marL="514350" indent="-514350" algn="l" fontAlgn="base">
+              <a:buFont typeface="+mj-lt"/>
+              <a:buAutoNum type="arabicParenR"/>
+            </a:pPr>
+            <a:r>
+              <a:rPr lang="en-GB" u="none" strike="noStrike" dirty="0">
+                <a:effectLst/>
+              </a:rPr>
+              <a:t>Explain to the duck what your code is supposed to do, and then go into detail and explain your code line by line.</a:t>
+            </a:r>
+          </a:p>
+          <a:p>
+            <a:pPr marL="514350" indent="-514350" algn="l" fontAlgn="base">
+              <a:buFont typeface="+mj-lt"/>
+              <a:buAutoNum type="arabicParenR"/>
+            </a:pPr>
+            <a:r>
+              <a:rPr lang="en-GB" u="none" strike="noStrike" dirty="0">
+                <a:effectLst/>
+              </a:rPr>
+              <a:t>At some point you will tell the duck what you are doing next and then realise that that is not in fact what you are actually doing. The duck will sit there serenely, happy in the knowledge that it has helped you on your way.</a:t>
+            </a:r>
+          </a:p>
+        </p:txBody>
+      </p:sp>
+      <p:pic>
+        <p:nvPicPr>
+          <p:cNvPr id="1028" name="Picture 4" descr="Rubber Duck Debugging. Wheres my rubber duck!? | by Kelly Dobbins | Medium">
+            <a:extLst>
+              <a:ext uri="{FF2B5EF4-FFF2-40B4-BE49-F238E27FC236}">
+                <a16:creationId xmlns:a16="http://schemas.microsoft.com/office/drawing/2014/main" id="{DCCF7E2A-6864-0460-D2A0-72783D9F5120}"/>
+              </a:ext>
+            </a:extLst>
+          </p:cNvPr>
+          <p:cNvPicPr>
+            <a:picLocks noChangeAspect="1" noChangeArrowheads="1"/>
+          </p:cNvPicPr>
+          <p:nvPr/>
+        </p:nvPicPr>
+        <p:blipFill rotWithShape="1">
+          <a:blip r:embed="rId2">
+            <a:extLst>
+              <a:ext uri="{28A0092B-C50C-407E-A947-70E740481C1C}">
+                <a14:useLocalDpi xmlns:a14="http://schemas.microsoft.com/office/drawing/2010/main" val="0"/>
+              </a:ext>
+            </a:extLst>
+          </a:blip>
+          <a:srcRect l="34250"/>
+          <a:stretch/>
+        </p:blipFill>
+        <p:spPr bwMode="auto">
+          <a:xfrm>
+            <a:off x="6967913" y="1569604"/>
+            <a:ext cx="4670102" cy="3718791"/>
+          </a:xfrm>
+          <a:prstGeom prst="rect">
+            <a:avLst/>
+          </a:prstGeom>
+          <a:noFill/>
+          <a:extLst>
+            <a:ext uri="{909E8E84-426E-40DD-AFC4-6F175D3DCCD1}">
+              <a14:hiddenFill xmlns:a14="http://schemas.microsoft.com/office/drawing/2010/main">
+                <a:solidFill>
+                  <a:srgbClr val="FFFFFF"/>
+                </a:solidFill>
+              </a14:hiddenFill>
+            </a:ext>
+          </a:extLst>
+        </p:spPr>
+      </p:pic>
+    </p:spTree>
+    <p:extLst>
+      <p:ext uri="{BB962C8B-B14F-4D97-AF65-F5344CB8AC3E}">
+        <p14:creationId xmlns:p14="http://schemas.microsoft.com/office/powerpoint/2010/main" val="2988442547"/>
+      </p:ext>
+    </p:extLst>
+  </p:cSld>
+  <p:clrMapOvr>
+    <a:masterClrMapping/>
+  </p:clrMapOvr>
+</p:sld>
+</file>
+
+<file path=ppt/slides/slide21.xml><?xml version="1.0" encoding="utf-8"?>
 <p:sld xmlns:a="http://schemas.openxmlformats.org/drawingml/2006/main" xmlns:r="http://schemas.openxmlformats.org/officeDocument/2006/relationships" xmlns:p="http://schemas.openxmlformats.org/presentationml/2006/main">
   <p:cSld>
     <p:spTree>

</xml_diff>

<commit_message>
Added updates for week_5
</commit_message>
<xml_diff>
--- a/slides/PS4106 - debugging.pptx
+++ b/slides/PS4106 - debugging.pptx
@@ -23,9 +23,8 @@
     <p:sldId id="267" r:id="rId17"/>
     <p:sldId id="269" r:id="rId18"/>
     <p:sldId id="268" r:id="rId19"/>
-    <p:sldId id="276" r:id="rId20"/>
-    <p:sldId id="271" r:id="rId21"/>
-    <p:sldId id="272" r:id="rId22"/>
+    <p:sldId id="271" r:id="rId20"/>
+    <p:sldId id="272" r:id="rId21"/>
   </p:sldIdLst>
   <p:sldSz cx="12192000" cy="6858000"/>
   <p:notesSz cx="6858000" cy="9144000"/>
@@ -4947,211 +4946,6 @@
 <file path=ppt/slides/slide19.xml><?xml version="1.0" encoding="utf-8"?>
 <p:sld xmlns:a="http://schemas.openxmlformats.org/drawingml/2006/main" xmlns:r="http://schemas.openxmlformats.org/officeDocument/2006/relationships" xmlns:p="http://schemas.openxmlformats.org/presentationml/2006/main">
   <p:cSld>
-    <p:bg>
-      <p:bgPr>
-        <a:solidFill>
-          <a:schemeClr val="bg1"/>
-        </a:solidFill>
-        <a:effectLst/>
-      </p:bgPr>
-    </p:bg>
-    <p:spTree>
-      <p:nvGrpSpPr>
-        <p:cNvPr id="1" name=""/>
-        <p:cNvGrpSpPr/>
-        <p:nvPr/>
-      </p:nvGrpSpPr>
-      <p:grpSpPr>
-        <a:xfrm>
-          <a:off x="0" y="0"/>
-          <a:ext cx="0" cy="0"/>
-          <a:chOff x="0" y="0"/>
-          <a:chExt cx="0" cy="0"/>
-        </a:xfrm>
-      </p:grpSpPr>
-      <p:pic>
-        <p:nvPicPr>
-          <p:cNvPr id="4" name="Content Placeholder 3" descr="A screenshot of a computer screen&#10;&#10;Description automatically generated">
-            <a:extLst>
-              <a:ext uri="{FF2B5EF4-FFF2-40B4-BE49-F238E27FC236}">
-                <a16:creationId xmlns:a16="http://schemas.microsoft.com/office/drawing/2014/main" id="{16B5098C-74ED-3C3C-F4EB-E50C35C7B96C}"/>
-              </a:ext>
-            </a:extLst>
-          </p:cNvPr>
-          <p:cNvPicPr>
-            <a:picLocks noGrp="1" noChangeAspect="1"/>
-          </p:cNvPicPr>
-          <p:nvPr>
-            <p:ph idx="1"/>
-          </p:nvPr>
-        </p:nvPicPr>
-        <p:blipFill>
-          <a:blip r:embed="rId2"/>
-          <a:stretch>
-            <a:fillRect/>
-          </a:stretch>
-        </p:blipFill>
-        <p:spPr>
-          <a:xfrm>
-            <a:off x="1639147" y="643466"/>
-            <a:ext cx="8913706" cy="5571067"/>
-          </a:xfrm>
-          <a:prstGeom prst="rect">
-            <a:avLst/>
-          </a:prstGeom>
-        </p:spPr>
-      </p:pic>
-    </p:spTree>
-    <p:extLst>
-      <p:ext uri="{BB962C8B-B14F-4D97-AF65-F5344CB8AC3E}">
-        <p14:creationId xmlns:p14="http://schemas.microsoft.com/office/powerpoint/2010/main" val="2820083756"/>
-      </p:ext>
-    </p:extLst>
-  </p:cSld>
-  <p:clrMapOvr>
-    <a:masterClrMapping/>
-  </p:clrMapOvr>
-</p:sld>
-</file>
-
-<file path=ppt/slides/slide2.xml><?xml version="1.0" encoding="utf-8"?>
-<p:sld xmlns:a="http://schemas.openxmlformats.org/drawingml/2006/main" xmlns:r="http://schemas.openxmlformats.org/officeDocument/2006/relationships" xmlns:p="http://schemas.openxmlformats.org/presentationml/2006/main">
-  <p:cSld>
-    <p:spTree>
-      <p:nvGrpSpPr>
-        <p:cNvPr id="1" name=""/>
-        <p:cNvGrpSpPr/>
-        <p:nvPr/>
-      </p:nvGrpSpPr>
-      <p:grpSpPr>
-        <a:xfrm>
-          <a:off x="0" y="0"/>
-          <a:ext cx="0" cy="0"/>
-          <a:chOff x="0" y="0"/>
-          <a:chExt cx="0" cy="0"/>
-        </a:xfrm>
-      </p:grpSpPr>
-      <p:sp>
-        <p:nvSpPr>
-          <p:cNvPr id="2" name="Title 1">
-            <a:extLst>
-              <a:ext uri="{FF2B5EF4-FFF2-40B4-BE49-F238E27FC236}">
-                <a16:creationId xmlns:a16="http://schemas.microsoft.com/office/drawing/2014/main" id="{CC30DE25-E7CA-4243-BE4B-7B4565C09416}"/>
-              </a:ext>
-            </a:extLst>
-          </p:cNvPr>
-          <p:cNvSpPr>
-            <a:spLocks noGrp="1"/>
-          </p:cNvSpPr>
-          <p:nvPr>
-            <p:ph type="title"/>
-          </p:nvPr>
-        </p:nvSpPr>
-        <p:spPr>
-          <a:xfrm>
-            <a:off x="646814" y="365125"/>
-            <a:ext cx="10515600" cy="1325563"/>
-          </a:xfrm>
-        </p:spPr>
-        <p:txBody>
-          <a:bodyPr/>
-          <a:lstStyle/>
-          <a:p>
-            <a:r>
-              <a:rPr lang="en-US" dirty="0"/>
-              <a:t>Nobody  Writes Perfect Code</a:t>
-            </a:r>
-          </a:p>
-        </p:txBody>
-      </p:sp>
-      <p:sp>
-        <p:nvSpPr>
-          <p:cNvPr id="3" name="Content Placeholder 2">
-            <a:extLst>
-              <a:ext uri="{FF2B5EF4-FFF2-40B4-BE49-F238E27FC236}">
-                <a16:creationId xmlns:a16="http://schemas.microsoft.com/office/drawing/2014/main" id="{C4E3129D-D312-904F-BA92-A7FA951339C4}"/>
-              </a:ext>
-            </a:extLst>
-          </p:cNvPr>
-          <p:cNvSpPr>
-            <a:spLocks noGrp="1"/>
-          </p:cNvSpPr>
-          <p:nvPr>
-            <p:ph idx="1"/>
-          </p:nvPr>
-        </p:nvSpPr>
-        <p:spPr/>
-        <p:txBody>
-          <a:bodyPr/>
-          <a:lstStyle/>
-          <a:p>
-            <a:endParaRPr lang="en-US"/>
-          </a:p>
-        </p:txBody>
-      </p:sp>
-      <p:pic>
-        <p:nvPicPr>
-          <p:cNvPr id="1026" name="Picture 2" descr="Inexplicable">
-            <a:extLst>
-              <a:ext uri="{FF2B5EF4-FFF2-40B4-BE49-F238E27FC236}">
-                <a16:creationId xmlns:a16="http://schemas.microsoft.com/office/drawing/2014/main" id="{07D701A3-8582-5C4D-87F0-3E1C54F4718B}"/>
-              </a:ext>
-            </a:extLst>
-          </p:cNvPr>
-          <p:cNvPicPr>
-            <a:picLocks noChangeAspect="1" noChangeArrowheads="1"/>
-          </p:cNvPicPr>
-          <p:nvPr/>
-        </p:nvPicPr>
-        <p:blipFill>
-          <a:blip r:embed="rId2">
-            <a:extLst>
-              <a:ext uri="{28A0092B-C50C-407E-A947-70E740481C1C}">
-                <a14:useLocalDpi xmlns:a14="http://schemas.microsoft.com/office/drawing/2010/main" val="0"/>
-              </a:ext>
-            </a:extLst>
-          </a:blip>
-          <a:srcRect/>
-          <a:stretch>
-            <a:fillRect/>
-          </a:stretch>
-        </p:blipFill>
-        <p:spPr bwMode="auto">
-          <a:xfrm>
-            <a:off x="1205614" y="1758950"/>
-            <a:ext cx="9398000" cy="3340100"/>
-          </a:xfrm>
-          <a:prstGeom prst="rect">
-            <a:avLst/>
-          </a:prstGeom>
-          <a:noFill/>
-          <a:extLst>
-            <a:ext uri="{909E8E84-426E-40DD-AFC4-6F175D3DCCD1}">
-              <a14:hiddenFill xmlns:a14="http://schemas.microsoft.com/office/drawing/2010/main">
-                <a:solidFill>
-                  <a:srgbClr val="FFFFFF"/>
-                </a:solidFill>
-              </a14:hiddenFill>
-            </a:ext>
-          </a:extLst>
-        </p:spPr>
-      </p:pic>
-    </p:spTree>
-    <p:extLst>
-      <p:ext uri="{BB962C8B-B14F-4D97-AF65-F5344CB8AC3E}">
-        <p14:creationId xmlns:p14="http://schemas.microsoft.com/office/powerpoint/2010/main" val="521965133"/>
-      </p:ext>
-    </p:extLst>
-  </p:cSld>
-  <p:clrMapOvr>
-    <a:masterClrMapping/>
-  </p:clrMapOvr>
-</p:sld>
-</file>
-
-<file path=ppt/slides/slide20.xml><?xml version="1.0" encoding="utf-8"?>
-<p:sld xmlns:a="http://schemas.openxmlformats.org/drawingml/2006/main" xmlns:r="http://schemas.openxmlformats.org/officeDocument/2006/relationships" xmlns:p="http://schemas.openxmlformats.org/presentationml/2006/main">
-  <p:cSld>
     <p:spTree>
       <p:nvGrpSpPr>
         <p:cNvPr id="1" name=""/>
@@ -5322,7 +5116,142 @@
 </p:sld>
 </file>
 
-<file path=ppt/slides/slide21.xml><?xml version="1.0" encoding="utf-8"?>
+<file path=ppt/slides/slide2.xml><?xml version="1.0" encoding="utf-8"?>
+<p:sld xmlns:a="http://schemas.openxmlformats.org/drawingml/2006/main" xmlns:r="http://schemas.openxmlformats.org/officeDocument/2006/relationships" xmlns:p="http://schemas.openxmlformats.org/presentationml/2006/main">
+  <p:cSld>
+    <p:spTree>
+      <p:nvGrpSpPr>
+        <p:cNvPr id="1" name=""/>
+        <p:cNvGrpSpPr/>
+        <p:nvPr/>
+      </p:nvGrpSpPr>
+      <p:grpSpPr>
+        <a:xfrm>
+          <a:off x="0" y="0"/>
+          <a:ext cx="0" cy="0"/>
+          <a:chOff x="0" y="0"/>
+          <a:chExt cx="0" cy="0"/>
+        </a:xfrm>
+      </p:grpSpPr>
+      <p:sp>
+        <p:nvSpPr>
+          <p:cNvPr id="2" name="Title 1">
+            <a:extLst>
+              <a:ext uri="{FF2B5EF4-FFF2-40B4-BE49-F238E27FC236}">
+                <a16:creationId xmlns:a16="http://schemas.microsoft.com/office/drawing/2014/main" id="{CC30DE25-E7CA-4243-BE4B-7B4565C09416}"/>
+              </a:ext>
+            </a:extLst>
+          </p:cNvPr>
+          <p:cNvSpPr>
+            <a:spLocks noGrp="1"/>
+          </p:cNvSpPr>
+          <p:nvPr>
+            <p:ph type="title"/>
+          </p:nvPr>
+        </p:nvSpPr>
+        <p:spPr>
+          <a:xfrm>
+            <a:off x="646814" y="365125"/>
+            <a:ext cx="10515600" cy="1325563"/>
+          </a:xfrm>
+        </p:spPr>
+        <p:txBody>
+          <a:bodyPr/>
+          <a:lstStyle/>
+          <a:p>
+            <a:r>
+              <a:rPr lang="en-US" dirty="0"/>
+              <a:t>Nobody  Writes Perfect Code</a:t>
+            </a:r>
+          </a:p>
+        </p:txBody>
+      </p:sp>
+      <p:sp>
+        <p:nvSpPr>
+          <p:cNvPr id="3" name="Content Placeholder 2">
+            <a:extLst>
+              <a:ext uri="{FF2B5EF4-FFF2-40B4-BE49-F238E27FC236}">
+                <a16:creationId xmlns:a16="http://schemas.microsoft.com/office/drawing/2014/main" id="{C4E3129D-D312-904F-BA92-A7FA951339C4}"/>
+              </a:ext>
+            </a:extLst>
+          </p:cNvPr>
+          <p:cNvSpPr>
+            <a:spLocks noGrp="1"/>
+          </p:cNvSpPr>
+          <p:nvPr>
+            <p:ph idx="1"/>
+          </p:nvPr>
+        </p:nvSpPr>
+        <p:spPr/>
+        <p:txBody>
+          <a:bodyPr/>
+          <a:lstStyle/>
+          <a:p>
+            <a:endParaRPr lang="en-US"/>
+          </a:p>
+        </p:txBody>
+      </p:sp>
+      <p:pic>
+        <p:nvPicPr>
+          <p:cNvPr id="1026" name="Picture 2" descr="Inexplicable">
+            <a:extLst>
+              <a:ext uri="{FF2B5EF4-FFF2-40B4-BE49-F238E27FC236}">
+                <a16:creationId xmlns:a16="http://schemas.microsoft.com/office/drawing/2014/main" id="{07D701A3-8582-5C4D-87F0-3E1C54F4718B}"/>
+              </a:ext>
+            </a:extLst>
+          </p:cNvPr>
+          <p:cNvPicPr>
+            <a:picLocks noChangeAspect="1" noChangeArrowheads="1"/>
+          </p:cNvPicPr>
+          <p:nvPr/>
+        </p:nvPicPr>
+        <p:blipFill>
+          <a:blip r:embed="rId2">
+            <a:extLst>
+              <a:ext uri="{28A0092B-C50C-407E-A947-70E740481C1C}">
+                <a14:useLocalDpi xmlns:a14="http://schemas.microsoft.com/office/drawing/2010/main" val="0"/>
+              </a:ext>
+            </a:extLst>
+          </a:blip>
+          <a:srcRect/>
+          <a:stretch>
+            <a:fillRect/>
+          </a:stretch>
+        </p:blipFill>
+        <p:spPr bwMode="auto">
+          <a:xfrm>
+            <a:off x="1205614" y="1825625"/>
+            <a:ext cx="9398000" cy="3340100"/>
+          </a:xfrm>
+          <a:prstGeom prst="rect">
+            <a:avLst/>
+          </a:prstGeom>
+          <a:noFill/>
+          <a:extLst>
+            <a:ext uri="{909E8E84-426E-40DD-AFC4-6F175D3DCCD1}">
+              <a14:hiddenFill xmlns:a14="http://schemas.microsoft.com/office/drawing/2010/main">
+                <a:solidFill>
+                  <a:srgbClr val="FFFFFF"/>
+                </a:solidFill>
+              </a14:hiddenFill>
+            </a:ext>
+          </a:extLst>
+        </p:spPr>
+      </p:pic>
+    </p:spTree>
+    <p:extLst>
+      <p:ext uri="{BB962C8B-B14F-4D97-AF65-F5344CB8AC3E}">
+        <p14:creationId xmlns:p14="http://schemas.microsoft.com/office/powerpoint/2010/main" val="521965133"/>
+      </p:ext>
+    </p:extLst>
+  </p:cSld>
+  <p:clrMapOvr>
+    <a:masterClrMapping/>
+  </p:clrMapOvr>
+</p:sld>
+</file>
+
+<file path=ppt/slides/slide20.xml><?xml version="1.0" encoding="utf-8"?>
 <p:sld xmlns:a="http://schemas.openxmlformats.org/drawingml/2006/main" xmlns:r="http://schemas.openxmlformats.org/officeDocument/2006/relationships" xmlns:p="http://schemas.openxmlformats.org/presentationml/2006/main">
   <p:cSld>
     <p:spTree>

</xml_diff>